<commit_message>
really not that important
</commit_message>
<xml_diff>
--- a/paper1/examples.pptx
+++ b/paper1/examples.pptx
@@ -5,9 +5,8 @@
     <p:sldMasterId id="2147483648" r:id="rId1"/>
   </p:sldMasterIdLst>
   <p:sldIdLst>
-    <p:sldId id="256" r:id="rId2"/>
-    <p:sldId id="257" r:id="rId3"/>
-    <p:sldId id="258" r:id="rId4"/>
+    <p:sldId id="257" r:id="rId2"/>
+    <p:sldId id="258" r:id="rId3"/>
   </p:sldIdLst>
   <p:sldSz cx="9144000" cy="6858000" type="screen4x3"/>
   <p:notesSz cx="6858000" cy="9144000"/>
@@ -290,7 +289,7 @@
           <a:p>
             <a:fld id="{0A76EA49-31E0-3848-9ADF-F3426262647D}" type="datetimeFigureOut">
               <a:rPr lang="en-US" smtClean="0"/>
-              <a:t>9/10/15</a:t>
+              <a:t>9/16/15</a:t>
             </a:fld>
             <a:endParaRPr lang="en-US"/>
           </a:p>
@@ -460,7 +459,7 @@
           <a:p>
             <a:fld id="{0A76EA49-31E0-3848-9ADF-F3426262647D}" type="datetimeFigureOut">
               <a:rPr lang="en-US" smtClean="0"/>
-              <a:t>9/10/15</a:t>
+              <a:t>9/16/15</a:t>
             </a:fld>
             <a:endParaRPr lang="en-US"/>
           </a:p>
@@ -640,7 +639,7 @@
           <a:p>
             <a:fld id="{0A76EA49-31E0-3848-9ADF-F3426262647D}" type="datetimeFigureOut">
               <a:rPr lang="en-US" smtClean="0"/>
-              <a:t>9/10/15</a:t>
+              <a:t>9/16/15</a:t>
             </a:fld>
             <a:endParaRPr lang="en-US"/>
           </a:p>
@@ -810,7 +809,7 @@
           <a:p>
             <a:fld id="{0A76EA49-31E0-3848-9ADF-F3426262647D}" type="datetimeFigureOut">
               <a:rPr lang="en-US" smtClean="0"/>
-              <a:t>9/10/15</a:t>
+              <a:t>9/16/15</a:t>
             </a:fld>
             <a:endParaRPr lang="en-US"/>
           </a:p>
@@ -1056,7 +1055,7 @@
           <a:p>
             <a:fld id="{0A76EA49-31E0-3848-9ADF-F3426262647D}" type="datetimeFigureOut">
               <a:rPr lang="en-US" smtClean="0"/>
-              <a:t>9/10/15</a:t>
+              <a:t>9/16/15</a:t>
             </a:fld>
             <a:endParaRPr lang="en-US"/>
           </a:p>
@@ -1344,7 +1343,7 @@
           <a:p>
             <a:fld id="{0A76EA49-31E0-3848-9ADF-F3426262647D}" type="datetimeFigureOut">
               <a:rPr lang="en-US" smtClean="0"/>
-              <a:t>9/10/15</a:t>
+              <a:t>9/16/15</a:t>
             </a:fld>
             <a:endParaRPr lang="en-US"/>
           </a:p>
@@ -1766,7 +1765,7 @@
           <a:p>
             <a:fld id="{0A76EA49-31E0-3848-9ADF-F3426262647D}" type="datetimeFigureOut">
               <a:rPr lang="en-US" smtClean="0"/>
-              <a:t>9/10/15</a:t>
+              <a:t>9/16/15</a:t>
             </a:fld>
             <a:endParaRPr lang="en-US"/>
           </a:p>
@@ -1884,7 +1883,7 @@
           <a:p>
             <a:fld id="{0A76EA49-31E0-3848-9ADF-F3426262647D}" type="datetimeFigureOut">
               <a:rPr lang="en-US" smtClean="0"/>
-              <a:t>9/10/15</a:t>
+              <a:t>9/16/15</a:t>
             </a:fld>
             <a:endParaRPr lang="en-US"/>
           </a:p>
@@ -1979,7 +1978,7 @@
           <a:p>
             <a:fld id="{0A76EA49-31E0-3848-9ADF-F3426262647D}" type="datetimeFigureOut">
               <a:rPr lang="en-US" smtClean="0"/>
-              <a:t>9/10/15</a:t>
+              <a:t>9/16/15</a:t>
             </a:fld>
             <a:endParaRPr lang="en-US"/>
           </a:p>
@@ -2256,7 +2255,7 @@
           <a:p>
             <a:fld id="{0A76EA49-31E0-3848-9ADF-F3426262647D}" type="datetimeFigureOut">
               <a:rPr lang="en-US" smtClean="0"/>
-              <a:t>9/10/15</a:t>
+              <a:t>9/16/15</a:t>
             </a:fld>
             <a:endParaRPr lang="en-US"/>
           </a:p>
@@ -2509,7 +2508,7 @@
           <a:p>
             <a:fld id="{0A76EA49-31E0-3848-9ADF-F3426262647D}" type="datetimeFigureOut">
               <a:rPr lang="en-US" smtClean="0"/>
-              <a:t>9/10/15</a:t>
+              <a:t>9/16/15</a:t>
             </a:fld>
             <a:endParaRPr lang="en-US"/>
           </a:p>
@@ -2722,7 +2721,7 @@
           <a:p>
             <a:fld id="{0A76EA49-31E0-3848-9ADF-F3426262647D}" type="datetimeFigureOut">
               <a:rPr lang="en-US" smtClean="0"/>
-              <a:t>9/10/15</a:t>
+              <a:t>9/16/15</a:t>
             </a:fld>
             <a:endParaRPr lang="en-US"/>
           </a:p>
@@ -3099,46 +3098,696 @@
       </p:grpSpPr>
       <p:sp>
         <p:nvSpPr>
-          <p:cNvPr id="2" name="Title 1"/>
-          <p:cNvSpPr>
-            <a:spLocks noGrp="1"/>
-          </p:cNvSpPr>
-          <p:nvPr>
-            <p:ph type="ctrTitle"/>
-          </p:nvPr>
-        </p:nvSpPr>
-        <p:spPr/>
-        <p:txBody>
-          <a:bodyPr/>
-          <a:lstStyle/>
-          <a:p>
-            <a:endParaRPr lang="en-US"/>
-          </a:p>
-        </p:txBody>
-      </p:sp>
-      <p:sp>
-        <p:nvSpPr>
-          <p:cNvPr id="3" name="Subtitle 2"/>
-          <p:cNvSpPr>
-            <a:spLocks noGrp="1"/>
-          </p:cNvSpPr>
-          <p:nvPr>
-            <p:ph type="subTitle" idx="1"/>
-          </p:nvPr>
-        </p:nvSpPr>
-        <p:spPr/>
-        <p:txBody>
-          <a:bodyPr/>
-          <a:lstStyle/>
-          <a:p>
-            <a:endParaRPr lang="en-US"/>
-          </a:p>
-        </p:txBody>
-      </p:sp>
+          <p:cNvPr id="3" name="Content Placeholder 2"/>
+          <p:cNvSpPr>
+            <a:spLocks noGrp="1"/>
+          </p:cNvSpPr>
+          <p:nvPr>
+            <p:ph idx="1"/>
+          </p:nvPr>
+        </p:nvSpPr>
+        <p:spPr>
+          <a:xfrm>
+            <a:off x="457200" y="1600201"/>
+            <a:ext cx="5419834" cy="3511550"/>
+          </a:xfrm>
+        </p:spPr>
+        <p:txBody>
+          <a:bodyPr>
+            <a:normAutofit/>
+          </a:bodyPr>
+          <a:lstStyle/>
+          <a:p>
+            <a:pPr marL="0" indent="0">
+              <a:buNone/>
+            </a:pPr>
+            <a:r>
+              <a:rPr lang="en-US" sz="1200" dirty="0" smtClean="0">
+                <a:latin typeface="Courier"/>
+                <a:cs typeface="Courier"/>
+              </a:rPr>
+              <a:t>1: void foo(</a:t>
+            </a:r>
+            <a:r>
+              <a:rPr lang="en-US" sz="1200" dirty="0" err="1" smtClean="0">
+                <a:latin typeface="Courier"/>
+                <a:cs typeface="Courier"/>
+              </a:rPr>
+              <a:t>int</a:t>
+            </a:r>
+            <a:r>
+              <a:rPr lang="en-US" sz="1200" dirty="0" smtClean="0">
+                <a:latin typeface="Courier"/>
+                <a:cs typeface="Courier"/>
+              </a:rPr>
+              <a:t> a, </a:t>
+            </a:r>
+            <a:r>
+              <a:rPr lang="en-US" sz="1200" dirty="0" err="1" smtClean="0">
+                <a:latin typeface="Courier"/>
+                <a:cs typeface="Courier"/>
+              </a:rPr>
+              <a:t>int</a:t>
+            </a:r>
+            <a:r>
+              <a:rPr lang="en-US" sz="1200" dirty="0" smtClean="0">
+                <a:latin typeface="Courier"/>
+                <a:cs typeface="Courier"/>
+              </a:rPr>
+              <a:t> b, char *s, char *d, </a:t>
+            </a:r>
+            <a:r>
+              <a:rPr lang="en-US" sz="1200" dirty="0" err="1" smtClean="0">
+                <a:latin typeface="Courier"/>
+                <a:cs typeface="Courier"/>
+              </a:rPr>
+              <a:t>int</a:t>
+            </a:r>
+            <a:r>
+              <a:rPr lang="en-US" sz="1200" dirty="0" smtClean="0">
+                <a:latin typeface="Courier"/>
+                <a:cs typeface="Courier"/>
+              </a:rPr>
+              <a:t> n) {</a:t>
+            </a:r>
+          </a:p>
+          <a:p>
+            <a:pPr marL="0" indent="0">
+              <a:buNone/>
+            </a:pPr>
+            <a:r>
+              <a:rPr lang="en-US" sz="1200" dirty="0" smtClean="0">
+                <a:latin typeface="Courier"/>
+                <a:cs typeface="Courier"/>
+              </a:rPr>
+              <a:t>2:   </a:t>
+            </a:r>
+            <a:r>
+              <a:rPr lang="en-US" sz="1200" dirty="0" err="1" smtClean="0">
+                <a:latin typeface="Courier"/>
+                <a:cs typeface="Courier"/>
+              </a:rPr>
+              <a:t>int</a:t>
+            </a:r>
+            <a:r>
+              <a:rPr lang="en-US" sz="1200" dirty="0" smtClean="0">
+                <a:latin typeface="Courier"/>
+                <a:cs typeface="Courier"/>
+              </a:rPr>
+              <a:t> c = </a:t>
+            </a:r>
+            <a:r>
+              <a:rPr lang="en-US" sz="1200" dirty="0" err="1" smtClean="0">
+                <a:latin typeface="Courier"/>
+                <a:cs typeface="Courier"/>
+              </a:rPr>
+              <a:t>a+b</a:t>
+            </a:r>
+            <a:r>
+              <a:rPr lang="en-US" sz="1200" dirty="0" smtClean="0">
+                <a:latin typeface="Courier"/>
+                <a:cs typeface="Courier"/>
+              </a:rPr>
+              <a:t>;</a:t>
+            </a:r>
+          </a:p>
+          <a:p>
+            <a:pPr marL="0" indent="0">
+              <a:buNone/>
+            </a:pPr>
+            <a:r>
+              <a:rPr lang="en-US" sz="1200" dirty="0" smtClean="0">
+                <a:latin typeface="Courier"/>
+                <a:cs typeface="Courier"/>
+              </a:rPr>
+              <a:t>3:   if (a == 0xdeadbeef) </a:t>
+            </a:r>
+          </a:p>
+          <a:p>
+            <a:pPr marL="0" indent="0">
+              <a:buNone/>
+            </a:pPr>
+            <a:r>
+              <a:rPr lang="en-US" sz="1200" dirty="0" smtClean="0">
+                <a:latin typeface="Courier"/>
+                <a:cs typeface="Courier"/>
+              </a:rPr>
+              <a:t>4:     return;  </a:t>
+            </a:r>
+          </a:p>
+          <a:p>
+            <a:pPr marL="0" indent="0">
+              <a:buNone/>
+            </a:pPr>
+            <a:r>
+              <a:rPr lang="en-US" sz="1200" dirty="0" smtClean="0">
+                <a:latin typeface="Courier"/>
+                <a:cs typeface="Courier"/>
+              </a:rPr>
+              <a:t>5:   for (</a:t>
+            </a:r>
+            <a:r>
+              <a:rPr lang="en-US" sz="1200" dirty="0" err="1" smtClean="0">
+                <a:latin typeface="Courier"/>
+                <a:cs typeface="Courier"/>
+              </a:rPr>
+              <a:t>int</a:t>
+            </a:r>
+            <a:r>
+              <a:rPr lang="en-US" sz="1200" dirty="0" smtClean="0">
+                <a:latin typeface="Courier"/>
+                <a:cs typeface="Courier"/>
+              </a:rPr>
+              <a:t> </a:t>
+            </a:r>
+            <a:r>
+              <a:rPr lang="en-US" sz="1200" dirty="0" err="1" smtClean="0">
+                <a:latin typeface="Courier"/>
+                <a:cs typeface="Courier"/>
+              </a:rPr>
+              <a:t>i</a:t>
+            </a:r>
+            <a:r>
+              <a:rPr lang="en-US" sz="1200" dirty="0" smtClean="0">
+                <a:latin typeface="Courier"/>
+                <a:cs typeface="Courier"/>
+              </a:rPr>
+              <a:t>=0; </a:t>
+            </a:r>
+            <a:r>
+              <a:rPr lang="en-US" sz="1200" dirty="0" err="1" smtClean="0">
+                <a:latin typeface="Courier"/>
+                <a:cs typeface="Courier"/>
+              </a:rPr>
+              <a:t>i</a:t>
+            </a:r>
+            <a:r>
+              <a:rPr lang="en-US" sz="1200" dirty="0" smtClean="0">
+                <a:latin typeface="Courier"/>
+                <a:cs typeface="Courier"/>
+              </a:rPr>
+              <a:t>&lt;n; </a:t>
+            </a:r>
+            <a:r>
+              <a:rPr lang="en-US" sz="1200" dirty="0" err="1" smtClean="0">
+                <a:latin typeface="Courier"/>
+                <a:cs typeface="Courier"/>
+              </a:rPr>
+              <a:t>i</a:t>
+            </a:r>
+            <a:r>
+              <a:rPr lang="en-US" sz="1200" dirty="0" smtClean="0">
+                <a:latin typeface="Courier"/>
+                <a:cs typeface="Courier"/>
+              </a:rPr>
+              <a:t>++) </a:t>
+            </a:r>
+          </a:p>
+          <a:p>
+            <a:pPr marL="0" indent="0">
+              <a:buNone/>
+            </a:pPr>
+            <a:r>
+              <a:rPr lang="en-US" sz="1200" dirty="0" smtClean="0">
+                <a:latin typeface="Courier"/>
+                <a:cs typeface="Courier"/>
+              </a:rPr>
+              <a:t>6:     c+=s[</a:t>
+            </a:r>
+            <a:r>
+              <a:rPr lang="en-US" sz="1200" dirty="0" err="1" smtClean="0">
+                <a:latin typeface="Courier"/>
+                <a:cs typeface="Courier"/>
+              </a:rPr>
+              <a:t>i</a:t>
+            </a:r>
+            <a:r>
+              <a:rPr lang="en-US" sz="1200" dirty="0" smtClean="0">
+                <a:latin typeface="Courier"/>
+                <a:cs typeface="Courier"/>
+              </a:rPr>
+              <a:t>];</a:t>
+            </a:r>
+          </a:p>
+          <a:p>
+            <a:pPr marL="0" indent="0">
+              <a:buNone/>
+            </a:pPr>
+            <a:r>
+              <a:rPr lang="en-US" sz="1200" dirty="0" smtClean="0">
+                <a:latin typeface="Courier"/>
+                <a:cs typeface="Courier"/>
+              </a:rPr>
+              <a:t>7:   </a:t>
+            </a:r>
+            <a:r>
+              <a:rPr lang="en-US" sz="1200" dirty="0" err="1" smtClean="0">
+                <a:latin typeface="Courier"/>
+                <a:cs typeface="Courier"/>
+              </a:rPr>
+              <a:t>memcpy</a:t>
+            </a:r>
+            <a:r>
+              <a:rPr lang="en-US" sz="1200" dirty="0" smtClean="0">
+                <a:latin typeface="Courier"/>
+                <a:cs typeface="Courier"/>
+              </a:rPr>
+              <a:t>(</a:t>
+            </a:r>
+            <a:r>
+              <a:rPr lang="en-US" sz="1200" dirty="0" err="1" smtClean="0">
+                <a:latin typeface="Courier"/>
+                <a:cs typeface="Courier"/>
+              </a:rPr>
+              <a:t>d,s,n+c</a:t>
+            </a:r>
+            <a:r>
+              <a:rPr lang="en-US" sz="1200" dirty="0" smtClean="0">
+                <a:latin typeface="Courier"/>
+                <a:cs typeface="Courier"/>
+              </a:rPr>
+              <a:t>);</a:t>
+            </a:r>
+          </a:p>
+          <a:p>
+            <a:pPr marL="0" indent="0">
+              <a:buNone/>
+            </a:pPr>
+            <a:r>
+              <a:rPr lang="en-US" sz="1200" dirty="0" smtClean="0">
+                <a:latin typeface="Courier"/>
+                <a:cs typeface="Courier"/>
+              </a:rPr>
+              <a:t>8:   // BUG: </a:t>
+            </a:r>
+            <a:r>
+              <a:rPr lang="en-US" sz="1200" dirty="0" err="1" smtClean="0">
+                <a:latin typeface="Courier"/>
+                <a:cs typeface="Courier"/>
+              </a:rPr>
+              <a:t>memcpy</a:t>
+            </a:r>
+            <a:r>
+              <a:rPr lang="en-US" sz="1200" dirty="0" smtClean="0">
+                <a:latin typeface="Courier"/>
+                <a:cs typeface="Courier"/>
+              </a:rPr>
+              <a:t>(d+(b==0x76697461)*</a:t>
+            </a:r>
+            <a:r>
+              <a:rPr lang="en-US" sz="1200" dirty="0" err="1" smtClean="0">
+                <a:latin typeface="Courier"/>
+                <a:cs typeface="Courier"/>
+              </a:rPr>
+              <a:t>b,s,n</a:t>
+            </a:r>
+            <a:r>
+              <a:rPr lang="en-US" sz="1200" dirty="0" smtClean="0">
+                <a:latin typeface="Courier"/>
+                <a:cs typeface="Courier"/>
+              </a:rPr>
+              <a:t>);</a:t>
+            </a:r>
+          </a:p>
+          <a:p>
+            <a:pPr marL="0" indent="0">
+              <a:buNone/>
+            </a:pPr>
+            <a:r>
+              <a:rPr lang="en-US" sz="1200" dirty="0" smtClean="0">
+                <a:latin typeface="Courier"/>
+                <a:cs typeface="Courier"/>
+              </a:rPr>
+              <a:t>9: }  </a:t>
+            </a:r>
+          </a:p>
+        </p:txBody>
+      </p:sp>
+      <p:sp>
+        <p:nvSpPr>
+          <p:cNvPr id="4" name="TextBox 3"/>
+          <p:cNvSpPr txBox="1"/>
+          <p:nvPr/>
+        </p:nvSpPr>
+        <p:spPr>
+          <a:xfrm>
+            <a:off x="5700109" y="1013936"/>
+            <a:ext cx="2224691" cy="738664"/>
+          </a:xfrm>
+          <a:prstGeom prst="rect">
+            <a:avLst/>
+          </a:prstGeom>
+          <a:noFill/>
+        </p:spPr>
+        <p:txBody>
+          <a:bodyPr wrap="square" rtlCol="0">
+            <a:spAutoFit/>
+          </a:bodyPr>
+          <a:lstStyle/>
+          <a:p>
+            <a:r>
+              <a:rPr lang="en-US" sz="1400" dirty="0" smtClean="0"/>
+              <a:t>a is bytes 0..3 of input</a:t>
+            </a:r>
+          </a:p>
+          <a:p>
+            <a:r>
+              <a:rPr lang="en-US" sz="1400" dirty="0" smtClean="0"/>
+              <a:t>b is 4..7, n is 8..</a:t>
+            </a:r>
+            <a:r>
+              <a:rPr lang="en-US" sz="1400" dirty="0" smtClean="0"/>
+              <a:t>11</a:t>
+            </a:r>
+          </a:p>
+          <a:p>
+            <a:r>
+              <a:rPr lang="en-US" sz="1400" dirty="0" smtClean="0"/>
+              <a:t>*s, *d untainted</a:t>
+            </a:r>
+            <a:endParaRPr lang="en-US" sz="1400" dirty="0" smtClean="0"/>
+          </a:p>
+        </p:txBody>
+      </p:sp>
+      <p:sp>
+        <p:nvSpPr>
+          <p:cNvPr id="5" name="Rectangle 4"/>
+          <p:cNvSpPr/>
+          <p:nvPr/>
+        </p:nvSpPr>
+        <p:spPr>
+          <a:xfrm>
+            <a:off x="5668545" y="1828800"/>
+            <a:ext cx="930163" cy="307777"/>
+          </a:xfrm>
+          <a:prstGeom prst="rect">
+            <a:avLst/>
+          </a:prstGeom>
+        </p:spPr>
+        <p:txBody>
+          <a:bodyPr wrap="none">
+            <a:spAutoFit/>
+          </a:bodyPr>
+          <a:lstStyle/>
+          <a:p>
+            <a:r>
+              <a:rPr lang="en-US" sz="1400" dirty="0" smtClean="0"/>
+              <a:t>TNC(c) = 1</a:t>
+            </a:r>
+            <a:endParaRPr lang="en-US" sz="1400" dirty="0"/>
+          </a:p>
+        </p:txBody>
+      </p:sp>
+      <p:sp>
+        <p:nvSpPr>
+          <p:cNvPr id="7" name="Rectangle 6"/>
+          <p:cNvSpPr/>
+          <p:nvPr/>
+        </p:nvSpPr>
+        <p:spPr>
+          <a:xfrm>
+            <a:off x="5668545" y="2044895"/>
+            <a:ext cx="1050350" cy="307777"/>
+          </a:xfrm>
+          <a:prstGeom prst="rect">
+            <a:avLst/>
+          </a:prstGeom>
+        </p:spPr>
+        <p:txBody>
+          <a:bodyPr wrap="none">
+            <a:spAutoFit/>
+          </a:bodyPr>
+          <a:lstStyle/>
+          <a:p>
+            <a:r>
+              <a:rPr lang="en-US" sz="1400" dirty="0" smtClean="0"/>
+              <a:t>LIV(0..3) = 1</a:t>
+            </a:r>
+            <a:endParaRPr lang="en-US" sz="1400" dirty="0"/>
+          </a:p>
+        </p:txBody>
+      </p:sp>
+      <p:sp>
+        <p:nvSpPr>
+          <p:cNvPr id="10" name="Rectangle 9"/>
+          <p:cNvSpPr/>
+          <p:nvPr/>
+        </p:nvSpPr>
+        <p:spPr>
+          <a:xfrm>
+            <a:off x="5668545" y="2469081"/>
+            <a:ext cx="1144677" cy="307777"/>
+          </a:xfrm>
+          <a:prstGeom prst="rect">
+            <a:avLst/>
+          </a:prstGeom>
+        </p:spPr>
+        <p:txBody>
+          <a:bodyPr wrap="none">
+            <a:spAutoFit/>
+          </a:bodyPr>
+          <a:lstStyle/>
+          <a:p>
+            <a:r>
+              <a:rPr lang="en-US" sz="1400" dirty="0" smtClean="0"/>
+              <a:t>LIV(8..11) = n</a:t>
+            </a:r>
+            <a:endParaRPr lang="en-US" sz="1400" dirty="0"/>
+          </a:p>
+        </p:txBody>
+      </p:sp>
+      <p:sp>
+        <p:nvSpPr>
+          <p:cNvPr id="11" name="Rectangle 10"/>
+          <p:cNvSpPr/>
+          <p:nvPr/>
+        </p:nvSpPr>
+        <p:spPr>
+          <a:xfrm>
+            <a:off x="5668545" y="2816423"/>
+            <a:ext cx="1113907" cy="307777"/>
+          </a:xfrm>
+          <a:prstGeom prst="rect">
+            <a:avLst/>
+          </a:prstGeom>
+        </p:spPr>
+        <p:txBody>
+          <a:bodyPr wrap="none">
+            <a:spAutoFit/>
+          </a:bodyPr>
+          <a:lstStyle/>
+          <a:p>
+            <a:r>
+              <a:rPr lang="en-US" sz="1400" dirty="0" smtClean="0"/>
+              <a:t>TCN(c) = </a:t>
+            </a:r>
+            <a:r>
+              <a:rPr lang="en-US" sz="1400" dirty="0" smtClean="0"/>
+              <a:t>n+1</a:t>
+            </a:r>
+            <a:endParaRPr lang="en-US" sz="1400" dirty="0"/>
+          </a:p>
+        </p:txBody>
+      </p:sp>
+      <p:cxnSp>
+        <p:nvCxnSpPr>
+          <p:cNvPr id="15" name="Straight Connector 14"/>
+          <p:cNvCxnSpPr/>
+          <p:nvPr/>
+        </p:nvCxnSpPr>
+        <p:spPr>
+          <a:xfrm>
+            <a:off x="1828800" y="1371600"/>
+            <a:ext cx="3886200" cy="0"/>
+          </a:xfrm>
+          <a:prstGeom prst="line">
+            <a:avLst/>
+          </a:prstGeom>
+          <a:ln>
+            <a:solidFill>
+              <a:schemeClr val="bg1">
+                <a:lumMod val="65000"/>
+              </a:schemeClr>
+            </a:solidFill>
+            <a:prstDash val="sysDash"/>
+          </a:ln>
+          <a:effectLst/>
+        </p:spPr>
+        <p:style>
+          <a:lnRef idx="2">
+            <a:schemeClr val="accent1"/>
+          </a:lnRef>
+          <a:fillRef idx="0">
+            <a:schemeClr val="accent1"/>
+          </a:fillRef>
+          <a:effectRef idx="1">
+            <a:schemeClr val="accent1"/>
+          </a:effectRef>
+          <a:fontRef idx="minor">
+            <a:schemeClr val="tx1"/>
+          </a:fontRef>
+        </p:style>
+      </p:cxnSp>
+      <p:cxnSp>
+        <p:nvCxnSpPr>
+          <p:cNvPr id="16" name="Straight Connector 15"/>
+          <p:cNvCxnSpPr/>
+          <p:nvPr/>
+        </p:nvCxnSpPr>
+        <p:spPr>
+          <a:xfrm>
+            <a:off x="2286000" y="1996682"/>
+            <a:ext cx="3429000" cy="0"/>
+          </a:xfrm>
+          <a:prstGeom prst="line">
+            <a:avLst/>
+          </a:prstGeom>
+          <a:ln>
+            <a:solidFill>
+              <a:schemeClr val="bg1">
+                <a:lumMod val="65000"/>
+              </a:schemeClr>
+            </a:solidFill>
+            <a:prstDash val="sysDash"/>
+          </a:ln>
+          <a:effectLst/>
+        </p:spPr>
+        <p:style>
+          <a:lnRef idx="2">
+            <a:schemeClr val="accent1"/>
+          </a:lnRef>
+          <a:fillRef idx="0">
+            <a:schemeClr val="accent1"/>
+          </a:fillRef>
+          <a:effectRef idx="1">
+            <a:schemeClr val="accent1"/>
+          </a:effectRef>
+          <a:fontRef idx="minor">
+            <a:schemeClr val="tx1"/>
+          </a:fontRef>
+        </p:style>
+      </p:cxnSp>
+      <p:cxnSp>
+        <p:nvCxnSpPr>
+          <p:cNvPr id="18" name="Straight Connector 17"/>
+          <p:cNvCxnSpPr/>
+          <p:nvPr/>
+        </p:nvCxnSpPr>
+        <p:spPr>
+          <a:xfrm>
+            <a:off x="2971800" y="2209800"/>
+            <a:ext cx="2743200" cy="0"/>
+          </a:xfrm>
+          <a:prstGeom prst="line">
+            <a:avLst/>
+          </a:prstGeom>
+          <a:ln>
+            <a:solidFill>
+              <a:schemeClr val="bg1">
+                <a:lumMod val="65000"/>
+              </a:schemeClr>
+            </a:solidFill>
+            <a:prstDash val="sysDash"/>
+          </a:ln>
+          <a:effectLst/>
+        </p:spPr>
+        <p:style>
+          <a:lnRef idx="2">
+            <a:schemeClr val="accent1"/>
+          </a:lnRef>
+          <a:fillRef idx="0">
+            <a:schemeClr val="accent1"/>
+          </a:fillRef>
+          <a:effectRef idx="1">
+            <a:schemeClr val="accent1"/>
+          </a:effectRef>
+          <a:fontRef idx="minor">
+            <a:schemeClr val="tx1"/>
+          </a:fontRef>
+        </p:style>
+      </p:cxnSp>
+      <p:cxnSp>
+        <p:nvCxnSpPr>
+          <p:cNvPr id="20" name="Straight Connector 19"/>
+          <p:cNvCxnSpPr/>
+          <p:nvPr/>
+        </p:nvCxnSpPr>
+        <p:spPr>
+          <a:xfrm>
+            <a:off x="3200400" y="2667000"/>
+            <a:ext cx="2514600" cy="0"/>
+          </a:xfrm>
+          <a:prstGeom prst="line">
+            <a:avLst/>
+          </a:prstGeom>
+          <a:ln>
+            <a:solidFill>
+              <a:schemeClr val="bg1">
+                <a:lumMod val="65000"/>
+              </a:schemeClr>
+            </a:solidFill>
+            <a:prstDash val="sysDash"/>
+          </a:ln>
+          <a:effectLst/>
+        </p:spPr>
+        <p:style>
+          <a:lnRef idx="2">
+            <a:schemeClr val="accent1"/>
+          </a:lnRef>
+          <a:fillRef idx="0">
+            <a:schemeClr val="accent1"/>
+          </a:fillRef>
+          <a:effectRef idx="1">
+            <a:schemeClr val="accent1"/>
+          </a:effectRef>
+          <a:fontRef idx="minor">
+            <a:schemeClr val="tx1"/>
+          </a:fontRef>
+        </p:style>
+      </p:cxnSp>
+      <p:cxnSp>
+        <p:nvCxnSpPr>
+          <p:cNvPr id="25" name="Straight Connector 24"/>
+          <p:cNvCxnSpPr/>
+          <p:nvPr/>
+        </p:nvCxnSpPr>
+        <p:spPr>
+          <a:xfrm>
+            <a:off x="2057400" y="2973975"/>
+            <a:ext cx="3657600" cy="0"/>
+          </a:xfrm>
+          <a:prstGeom prst="line">
+            <a:avLst/>
+          </a:prstGeom>
+          <a:ln>
+            <a:solidFill>
+              <a:schemeClr val="bg1">
+                <a:lumMod val="65000"/>
+              </a:schemeClr>
+            </a:solidFill>
+            <a:prstDash val="sysDash"/>
+          </a:ln>
+          <a:effectLst/>
+        </p:spPr>
+        <p:style>
+          <a:lnRef idx="2">
+            <a:schemeClr val="accent1"/>
+          </a:lnRef>
+          <a:fillRef idx="0">
+            <a:schemeClr val="accent1"/>
+          </a:fillRef>
+          <a:effectRef idx="1">
+            <a:schemeClr val="accent1"/>
+          </a:effectRef>
+          <a:fontRef idx="minor">
+            <a:schemeClr val="tx1"/>
+          </a:fontRef>
+        </p:style>
+      </p:cxnSp>
     </p:spTree>
     <p:extLst>
       <p:ext uri="{BB962C8B-B14F-4D97-AF65-F5344CB8AC3E}">
-        <p14:creationId xmlns:p14="http://schemas.microsoft.com/office/powerpoint/2010/main" val="875015480"/>
+        <p14:creationId xmlns:p14="http://schemas.microsoft.com/office/powerpoint/2010/main" val="2533125954"/>
       </p:ext>
     </p:extLst>
   </p:cSld>
@@ -3174,611 +3823,14 @@
       </p:grpSpPr>
       <p:sp>
         <p:nvSpPr>
-          <p:cNvPr id="2" name="Title 1"/>
-          <p:cNvSpPr>
-            <a:spLocks noGrp="1"/>
-          </p:cNvSpPr>
-          <p:nvPr>
-            <p:ph type="title"/>
-          </p:nvPr>
-        </p:nvSpPr>
-        <p:spPr/>
-        <p:txBody>
-          <a:bodyPr/>
-          <a:lstStyle/>
-          <a:p>
-            <a:endParaRPr lang="en-US"/>
-          </a:p>
-        </p:txBody>
-      </p:sp>
-      <p:sp>
-        <p:nvSpPr>
-          <p:cNvPr id="3" name="Content Placeholder 2"/>
-          <p:cNvSpPr>
-            <a:spLocks noGrp="1"/>
-          </p:cNvSpPr>
-          <p:nvPr>
-            <p:ph idx="1"/>
-          </p:nvPr>
-        </p:nvSpPr>
-        <p:spPr>
-          <a:xfrm>
-            <a:off x="457200" y="1600201"/>
-            <a:ext cx="3503613" cy="3511550"/>
-          </a:xfrm>
-        </p:spPr>
-        <p:txBody>
-          <a:bodyPr>
-            <a:normAutofit/>
-          </a:bodyPr>
-          <a:lstStyle/>
-          <a:p>
-            <a:pPr marL="0" indent="0">
-              <a:buNone/>
-            </a:pPr>
-            <a:r>
-              <a:rPr lang="en-US" sz="1400" dirty="0">
-                <a:latin typeface="Courier"/>
-                <a:cs typeface="Courier"/>
-              </a:rPr>
-              <a:t>v</a:t>
-            </a:r>
-            <a:r>
-              <a:rPr lang="en-US" sz="1400" dirty="0" smtClean="0">
-                <a:latin typeface="Courier"/>
-                <a:cs typeface="Courier"/>
-              </a:rPr>
-              <a:t>oid foo(</a:t>
-            </a:r>
-            <a:r>
-              <a:rPr lang="en-US" sz="1400" dirty="0" err="1" smtClean="0">
-                <a:latin typeface="Courier"/>
-                <a:cs typeface="Courier"/>
-              </a:rPr>
-              <a:t>int</a:t>
-            </a:r>
-            <a:r>
-              <a:rPr lang="en-US" sz="1400" dirty="0" smtClean="0">
-                <a:latin typeface="Courier"/>
-                <a:cs typeface="Courier"/>
-              </a:rPr>
-              <a:t> a, </a:t>
-            </a:r>
-            <a:r>
-              <a:rPr lang="en-US" sz="1400" dirty="0" err="1" smtClean="0">
-                <a:latin typeface="Courier"/>
-                <a:cs typeface="Courier"/>
-              </a:rPr>
-              <a:t>int</a:t>
-            </a:r>
-            <a:r>
-              <a:rPr lang="en-US" sz="1400" dirty="0" smtClean="0">
-                <a:latin typeface="Courier"/>
-                <a:cs typeface="Courier"/>
-              </a:rPr>
-              <a:t> b, char *s, </a:t>
-            </a:r>
-          </a:p>
-          <a:p>
-            <a:pPr marL="0" indent="0">
-              <a:buNone/>
-            </a:pPr>
-            <a:r>
-              <a:rPr lang="en-US" sz="1400" dirty="0">
-                <a:latin typeface="Courier"/>
-                <a:cs typeface="Courier"/>
-              </a:rPr>
-              <a:t> </a:t>
-            </a:r>
-            <a:r>
-              <a:rPr lang="en-US" sz="1400" dirty="0" smtClean="0">
-                <a:latin typeface="Courier"/>
-                <a:cs typeface="Courier"/>
-              </a:rPr>
-              <a:t>        char *d, </a:t>
-            </a:r>
-            <a:r>
-              <a:rPr lang="en-US" sz="1400" dirty="0" err="1" smtClean="0">
-                <a:latin typeface="Courier"/>
-                <a:cs typeface="Courier"/>
-              </a:rPr>
-              <a:t>int</a:t>
-            </a:r>
-            <a:r>
-              <a:rPr lang="en-US" sz="1400" dirty="0" smtClean="0">
-                <a:latin typeface="Courier"/>
-                <a:cs typeface="Courier"/>
-              </a:rPr>
-              <a:t> n) {</a:t>
-            </a:r>
-          </a:p>
-          <a:p>
-            <a:pPr marL="0" indent="0">
-              <a:buNone/>
-            </a:pPr>
-            <a:r>
-              <a:rPr lang="en-US" sz="1400" dirty="0">
-                <a:latin typeface="Courier"/>
-                <a:cs typeface="Courier"/>
-              </a:rPr>
-              <a:t> </a:t>
-            </a:r>
-            <a:r>
-              <a:rPr lang="en-US" sz="1400" dirty="0" smtClean="0">
-                <a:latin typeface="Courier"/>
-                <a:cs typeface="Courier"/>
-              </a:rPr>
-              <a:t> </a:t>
-            </a:r>
-            <a:r>
-              <a:rPr lang="en-US" sz="1400" dirty="0" err="1" smtClean="0">
-                <a:latin typeface="Courier"/>
-                <a:cs typeface="Courier"/>
-              </a:rPr>
-              <a:t>int</a:t>
-            </a:r>
-            <a:r>
-              <a:rPr lang="en-US" sz="1400" dirty="0" smtClean="0">
-                <a:latin typeface="Courier"/>
-                <a:cs typeface="Courier"/>
-              </a:rPr>
-              <a:t> c = </a:t>
-            </a:r>
-            <a:r>
-              <a:rPr lang="en-US" sz="1400" dirty="0" err="1" smtClean="0">
-                <a:latin typeface="Courier"/>
-                <a:cs typeface="Courier"/>
-              </a:rPr>
-              <a:t>a+b</a:t>
-            </a:r>
-            <a:r>
-              <a:rPr lang="en-US" sz="1400" dirty="0" smtClean="0">
-                <a:latin typeface="Courier"/>
-                <a:cs typeface="Courier"/>
-              </a:rPr>
-              <a:t>;</a:t>
-            </a:r>
-          </a:p>
-          <a:p>
-            <a:pPr marL="0" indent="0">
-              <a:buNone/>
-            </a:pPr>
-            <a:r>
-              <a:rPr lang="en-US" sz="1400" dirty="0">
-                <a:latin typeface="Courier"/>
-                <a:cs typeface="Courier"/>
-              </a:rPr>
-              <a:t> </a:t>
-            </a:r>
-            <a:r>
-              <a:rPr lang="en-US" sz="1400" dirty="0" smtClean="0">
-                <a:latin typeface="Courier"/>
-                <a:cs typeface="Courier"/>
-              </a:rPr>
-              <a:t> if (a == 0xdeadbeef) </a:t>
-            </a:r>
-          </a:p>
-          <a:p>
-            <a:pPr marL="0" indent="0">
-              <a:buNone/>
-            </a:pPr>
-            <a:r>
-              <a:rPr lang="en-US" sz="1400" dirty="0">
-                <a:latin typeface="Courier"/>
-                <a:cs typeface="Courier"/>
-              </a:rPr>
-              <a:t> </a:t>
-            </a:r>
-            <a:r>
-              <a:rPr lang="en-US" sz="1400" dirty="0" smtClean="0">
-                <a:latin typeface="Courier"/>
-                <a:cs typeface="Courier"/>
-              </a:rPr>
-              <a:t>   return;  </a:t>
-            </a:r>
-          </a:p>
-          <a:p>
-            <a:pPr marL="0" indent="0">
-              <a:buNone/>
-            </a:pPr>
-            <a:r>
-              <a:rPr lang="en-US" sz="1400" dirty="0" smtClean="0">
-                <a:latin typeface="Courier"/>
-                <a:cs typeface="Courier"/>
-              </a:rPr>
-              <a:t>  </a:t>
-            </a:r>
-            <a:r>
-              <a:rPr lang="en-US" sz="1400" dirty="0" err="1" smtClean="0">
-                <a:latin typeface="Courier"/>
-                <a:cs typeface="Courier"/>
-              </a:rPr>
-              <a:t>memcpy</a:t>
-            </a:r>
-            <a:r>
-              <a:rPr lang="en-US" sz="1400" dirty="0" smtClean="0">
-                <a:latin typeface="Courier"/>
-                <a:cs typeface="Courier"/>
-              </a:rPr>
-              <a:t>(</a:t>
-            </a:r>
-            <a:r>
-              <a:rPr lang="en-US" sz="1400" dirty="0" err="1" smtClean="0">
-                <a:latin typeface="Courier"/>
-                <a:cs typeface="Courier"/>
-              </a:rPr>
-              <a:t>d,s,n</a:t>
-            </a:r>
-            <a:r>
-              <a:rPr lang="en-US" sz="1400" dirty="0" smtClean="0">
-                <a:latin typeface="Courier"/>
-                <a:cs typeface="Courier"/>
-              </a:rPr>
-              <a:t>);</a:t>
-            </a:r>
-          </a:p>
-          <a:p>
-            <a:pPr marL="0" indent="0">
-              <a:buNone/>
-            </a:pPr>
-            <a:r>
-              <a:rPr lang="en-US" sz="1400" dirty="0" smtClean="0">
-                <a:latin typeface="Courier"/>
-                <a:cs typeface="Courier"/>
-              </a:rPr>
-              <a:t>}  </a:t>
-            </a:r>
-          </a:p>
-        </p:txBody>
-      </p:sp>
-    </p:spTree>
-    <p:extLst>
-      <p:ext uri="{BB962C8B-B14F-4D97-AF65-F5344CB8AC3E}">
-        <p14:creationId xmlns:p14="http://schemas.microsoft.com/office/powerpoint/2010/main" val="2533125954"/>
-      </p:ext>
-    </p:extLst>
-  </p:cSld>
-  <p:clrMapOvr>
-    <a:masterClrMapping/>
-  </p:clrMapOvr>
-  <p:timing>
-    <p:tnLst>
-      <p:par>
-        <p:cTn xmlns:p14="http://schemas.microsoft.com/office/powerpoint/2010/main" id="1" dur="indefinite" restart="never" nodeType="tmRoot"/>
-      </p:par>
-    </p:tnLst>
-  </p:timing>
-</p:sld>
-</file>
-
-<file path=ppt/slides/slide3.xml><?xml version="1.0" encoding="utf-8"?>
-<p:sld xmlns:a="http://schemas.openxmlformats.org/drawingml/2006/main" xmlns:r="http://schemas.openxmlformats.org/officeDocument/2006/relationships" xmlns:p="http://schemas.openxmlformats.org/presentationml/2006/main">
-  <p:cSld>
-    <p:spTree>
-      <p:nvGrpSpPr>
-        <p:cNvPr id="1" name=""/>
-        <p:cNvGrpSpPr/>
-        <p:nvPr/>
-      </p:nvGrpSpPr>
-      <p:grpSpPr>
-        <a:xfrm>
-          <a:off x="0" y="0"/>
-          <a:ext cx="0" cy="0"/>
-          <a:chOff x="0" y="0"/>
-          <a:chExt cx="0" cy="0"/>
-        </a:xfrm>
-      </p:grpSpPr>
-      <p:sp>
-        <p:nvSpPr>
-          <p:cNvPr id="4" name="Content Placeholder 2"/>
-          <p:cNvSpPr>
-            <a:spLocks noGrp="1"/>
-          </p:cNvSpPr>
-          <p:nvPr>
-            <p:ph idx="1"/>
-          </p:nvPr>
-        </p:nvSpPr>
-        <p:spPr>
-          <a:xfrm>
-            <a:off x="533016" y="988872"/>
-            <a:ext cx="5125053" cy="2847404"/>
-          </a:xfrm>
-        </p:spPr>
-        <p:txBody>
-          <a:bodyPr>
-            <a:normAutofit/>
-          </a:bodyPr>
-          <a:lstStyle/>
-          <a:p>
-            <a:pPr marL="0" indent="0">
-              <a:buNone/>
-            </a:pPr>
-            <a:r>
-              <a:rPr lang="en-US" sz="1600" dirty="0" smtClean="0">
-                <a:latin typeface="Courier"/>
-                <a:cs typeface="Courier"/>
-              </a:rPr>
-              <a:t>   // </a:t>
-            </a:r>
-            <a:r>
-              <a:rPr lang="en-US" sz="1600" dirty="0" err="1" smtClean="0">
-                <a:latin typeface="Courier"/>
-                <a:cs typeface="Courier"/>
-              </a:rPr>
-              <a:t>tcn</a:t>
-            </a:r>
-            <a:r>
-              <a:rPr lang="en-US" sz="1600" dirty="0" smtClean="0">
-                <a:latin typeface="Courier"/>
-                <a:cs typeface="Courier"/>
-              </a:rPr>
-              <a:t>(a) = </a:t>
-            </a:r>
-            <a:r>
-              <a:rPr lang="en-US" sz="1600" dirty="0" err="1" smtClean="0">
-                <a:latin typeface="Courier"/>
-                <a:cs typeface="Courier"/>
-              </a:rPr>
-              <a:t>tcn</a:t>
-            </a:r>
-            <a:r>
-              <a:rPr lang="en-US" sz="1600" dirty="0" smtClean="0">
-                <a:latin typeface="Courier"/>
-                <a:cs typeface="Courier"/>
-              </a:rPr>
-              <a:t>(b) = 0</a:t>
-            </a:r>
-          </a:p>
-          <a:p>
-            <a:pPr marL="0" indent="0">
-              <a:buNone/>
-            </a:pPr>
-            <a:r>
-              <a:rPr lang="en-US" sz="1600" dirty="0" smtClean="0">
-                <a:latin typeface="Courier"/>
-                <a:cs typeface="Courier"/>
-              </a:rPr>
-              <a:t>   // s[] not tainted</a:t>
-            </a:r>
-          </a:p>
-          <a:p>
-            <a:pPr marL="0" indent="0">
-              <a:buNone/>
-            </a:pPr>
-            <a:r>
-              <a:rPr lang="en-US" sz="1600" dirty="0" smtClean="0">
-                <a:latin typeface="Courier"/>
-                <a:cs typeface="Courier"/>
-              </a:rPr>
-              <a:t>1: void foo(</a:t>
-            </a:r>
-            <a:r>
-              <a:rPr lang="en-US" sz="1600" dirty="0" err="1" smtClean="0">
-                <a:latin typeface="Courier"/>
-                <a:cs typeface="Courier"/>
-              </a:rPr>
-              <a:t>int</a:t>
-            </a:r>
-            <a:r>
-              <a:rPr lang="en-US" sz="1600" dirty="0" smtClean="0">
-                <a:latin typeface="Courier"/>
-                <a:cs typeface="Courier"/>
-              </a:rPr>
-              <a:t> a, </a:t>
-            </a:r>
-            <a:r>
-              <a:rPr lang="en-US" sz="1600" dirty="0" err="1" smtClean="0">
-                <a:latin typeface="Courier"/>
-                <a:cs typeface="Courier"/>
-              </a:rPr>
-              <a:t>int</a:t>
-            </a:r>
-            <a:r>
-              <a:rPr lang="en-US" sz="1600" dirty="0" smtClean="0">
-                <a:latin typeface="Courier"/>
-                <a:cs typeface="Courier"/>
-              </a:rPr>
-              <a:t> b, char *s) {</a:t>
-            </a:r>
-          </a:p>
-          <a:p>
-            <a:pPr marL="0" indent="0">
-              <a:buNone/>
-            </a:pPr>
-            <a:r>
-              <a:rPr lang="en-US" sz="1600" dirty="0" smtClean="0">
-                <a:latin typeface="Courier"/>
-                <a:cs typeface="Courier"/>
-              </a:rPr>
-              <a:t>2:   </a:t>
-            </a:r>
-            <a:r>
-              <a:rPr lang="en-US" sz="1600" dirty="0" err="1" smtClean="0">
-                <a:latin typeface="Courier"/>
-                <a:cs typeface="Courier"/>
-              </a:rPr>
-              <a:t>int</a:t>
-            </a:r>
-            <a:r>
-              <a:rPr lang="en-US" sz="1600" dirty="0" smtClean="0">
-                <a:latin typeface="Courier"/>
-                <a:cs typeface="Courier"/>
-              </a:rPr>
-              <a:t> c = </a:t>
-            </a:r>
-            <a:r>
-              <a:rPr lang="en-US" sz="1600" dirty="0" err="1" smtClean="0">
-                <a:latin typeface="Courier"/>
-                <a:cs typeface="Courier"/>
-              </a:rPr>
-              <a:t>a+b</a:t>
-            </a:r>
-            <a:r>
-              <a:rPr lang="en-US" sz="1600" dirty="0" smtClean="0">
-                <a:latin typeface="Courier"/>
-                <a:cs typeface="Courier"/>
-              </a:rPr>
-              <a:t>;              </a:t>
-            </a:r>
-            <a:endParaRPr lang="en-US" sz="1600" i="1" dirty="0" smtClean="0">
-              <a:latin typeface="Courier"/>
-              <a:cs typeface="Courier"/>
-            </a:endParaRPr>
-          </a:p>
-          <a:p>
-            <a:pPr marL="0" indent="0">
-              <a:buNone/>
-            </a:pPr>
-            <a:r>
-              <a:rPr lang="en-US" sz="1600" dirty="0" smtClean="0">
-                <a:latin typeface="Courier"/>
-                <a:cs typeface="Courier"/>
-              </a:rPr>
-              <a:t>3:   for (</a:t>
-            </a:r>
-            <a:r>
-              <a:rPr lang="en-US" sz="1600" dirty="0" err="1" smtClean="0">
-                <a:latin typeface="Courier"/>
-                <a:cs typeface="Courier"/>
-              </a:rPr>
-              <a:t>int</a:t>
-            </a:r>
-            <a:r>
-              <a:rPr lang="en-US" sz="1600" dirty="0" smtClean="0">
-                <a:latin typeface="Courier"/>
-                <a:cs typeface="Courier"/>
-              </a:rPr>
-              <a:t> </a:t>
-            </a:r>
-            <a:r>
-              <a:rPr lang="en-US" sz="1600" dirty="0" err="1" smtClean="0">
-                <a:latin typeface="Courier"/>
-                <a:cs typeface="Courier"/>
-              </a:rPr>
-              <a:t>i</a:t>
-            </a:r>
-            <a:r>
-              <a:rPr lang="en-US" sz="1600" dirty="0" smtClean="0">
-                <a:latin typeface="Courier"/>
-                <a:cs typeface="Courier"/>
-              </a:rPr>
-              <a:t>=0; </a:t>
-            </a:r>
-            <a:r>
-              <a:rPr lang="en-US" sz="1600" dirty="0" err="1" smtClean="0">
-                <a:latin typeface="Courier"/>
-                <a:cs typeface="Courier"/>
-              </a:rPr>
-              <a:t>i</a:t>
-            </a:r>
-            <a:r>
-              <a:rPr lang="en-US" sz="1600" dirty="0" smtClean="0">
-                <a:latin typeface="Courier"/>
-                <a:cs typeface="Courier"/>
-              </a:rPr>
-              <a:t>&lt;b; </a:t>
-            </a:r>
-            <a:r>
-              <a:rPr lang="en-US" sz="1600" dirty="0" err="1" smtClean="0">
-                <a:latin typeface="Courier"/>
-                <a:cs typeface="Courier"/>
-              </a:rPr>
-              <a:t>i</a:t>
-            </a:r>
-            <a:r>
-              <a:rPr lang="en-US" sz="1600" dirty="0" smtClean="0">
-                <a:latin typeface="Courier"/>
-                <a:cs typeface="Courier"/>
-              </a:rPr>
-              <a:t>++) </a:t>
-            </a:r>
-          </a:p>
-          <a:p>
-            <a:pPr marL="0" indent="0">
-              <a:buNone/>
-            </a:pPr>
-            <a:r>
-              <a:rPr lang="en-US" sz="1600" dirty="0" smtClean="0">
-                <a:latin typeface="Courier"/>
-                <a:cs typeface="Courier"/>
-              </a:rPr>
-              <a:t>4:     c += s[</a:t>
-            </a:r>
-            <a:r>
-              <a:rPr lang="en-US" sz="1600" dirty="0" err="1" smtClean="0">
-                <a:latin typeface="Courier"/>
-                <a:cs typeface="Courier"/>
-              </a:rPr>
-              <a:t>i</a:t>
-            </a:r>
-            <a:r>
-              <a:rPr lang="en-US" sz="1600" dirty="0" smtClean="0">
-                <a:latin typeface="Courier"/>
-                <a:cs typeface="Courier"/>
-              </a:rPr>
-              <a:t>];                                       </a:t>
-            </a:r>
-          </a:p>
-          <a:p>
-            <a:pPr marL="0" indent="0">
-              <a:buNone/>
-            </a:pPr>
-            <a:r>
-              <a:rPr lang="en-US" sz="1600" dirty="0" smtClean="0">
-                <a:latin typeface="Courier"/>
-                <a:cs typeface="Courier"/>
-              </a:rPr>
-              <a:t>5:                            </a:t>
-            </a:r>
-            <a:endParaRPr lang="en-US" sz="1400" i="1" dirty="0" smtClean="0">
-              <a:latin typeface="Courier"/>
-              <a:cs typeface="Courier"/>
-            </a:endParaRPr>
-          </a:p>
-          <a:p>
-            <a:pPr marL="0" indent="0">
-              <a:buNone/>
-            </a:pPr>
-            <a:r>
-              <a:rPr lang="en-US" sz="1600" dirty="0" smtClean="0">
-                <a:latin typeface="Courier"/>
-                <a:cs typeface="Courier"/>
-              </a:rPr>
-              <a:t>6:   c=0;                      </a:t>
-            </a:r>
-            <a:endParaRPr lang="en-US" sz="1600" i="1" dirty="0" smtClean="0">
-              <a:latin typeface="Courier"/>
-              <a:cs typeface="Courier"/>
-            </a:endParaRPr>
-          </a:p>
-          <a:p>
-            <a:pPr marL="0" indent="0">
-              <a:buNone/>
-            </a:pPr>
-            <a:r>
-              <a:rPr lang="en-US" sz="1600" smtClean="0">
-                <a:latin typeface="Courier"/>
-                <a:cs typeface="Courier"/>
-              </a:rPr>
-              <a:t>7: }  </a:t>
-            </a:r>
-            <a:endParaRPr lang="en-US" sz="1600" dirty="0" smtClean="0">
-              <a:latin typeface="Courier"/>
-              <a:cs typeface="Courier"/>
-            </a:endParaRPr>
-          </a:p>
-        </p:txBody>
-      </p:sp>
-      <p:sp>
-        <p:nvSpPr>
           <p:cNvPr id="10" name="TextBox 9"/>
           <p:cNvSpPr txBox="1"/>
           <p:nvPr/>
         </p:nvSpPr>
         <p:spPr>
           <a:xfrm>
-            <a:off x="1487129" y="5235531"/>
-            <a:ext cx="323188" cy="369332"/>
+            <a:off x="4033172" y="2584191"/>
+            <a:ext cx="274434" cy="261610"/>
           </a:xfrm>
           <a:prstGeom prst="rect">
             <a:avLst/>
@@ -3797,13 +3849,13 @@
           <a:lstStyle/>
           <a:p>
             <a:r>
-              <a:rPr lang="en-US" dirty="0" smtClean="0">
+              <a:rPr lang="en-US" sz="1050" dirty="0" smtClean="0">
                 <a:latin typeface="Courier"/>
                 <a:cs typeface="Courier"/>
               </a:rPr>
               <a:t>a</a:t>
             </a:r>
-            <a:endParaRPr lang="en-US" dirty="0">
+            <a:endParaRPr lang="en-US" sz="1050" dirty="0">
               <a:latin typeface="Courier"/>
               <a:cs typeface="Courier"/>
             </a:endParaRPr>
@@ -3818,8 +3870,8 @@
         </p:nvSpPr>
         <p:spPr>
           <a:xfrm>
-            <a:off x="2094978" y="5230276"/>
-            <a:ext cx="323188" cy="369332"/>
+            <a:off x="4423135" y="2575432"/>
+            <a:ext cx="269318" cy="261610"/>
           </a:xfrm>
           <a:prstGeom prst="rect">
             <a:avLst/>
@@ -3838,16 +3890,12 @@
           <a:lstStyle/>
           <a:p>
             <a:r>
-              <a:rPr lang="en-US" dirty="0">
+              <a:rPr lang="en-US" sz="1050" dirty="0">
                 <a:latin typeface="Courier"/>
                 <a:cs typeface="Courier"/>
               </a:rPr>
               <a:t>b</a:t>
             </a:r>
-            <a:endParaRPr lang="en-US" dirty="0">
-              <a:latin typeface="Courier"/>
-              <a:cs typeface="Courier"/>
-            </a:endParaRPr>
           </a:p>
         </p:txBody>
       </p:sp>
@@ -3859,8 +3907,8 @@
         </p:nvSpPr>
         <p:spPr>
           <a:xfrm>
-            <a:off x="1810317" y="4544335"/>
-            <a:ext cx="323188" cy="369332"/>
+            <a:off x="4245214" y="2109438"/>
+            <a:ext cx="269318" cy="261610"/>
           </a:xfrm>
           <a:prstGeom prst="rect">
             <a:avLst/>
@@ -3879,16 +3927,12 @@
           <a:lstStyle/>
           <a:p>
             <a:r>
-              <a:rPr lang="en-US" dirty="0">
+              <a:rPr lang="en-US" sz="1050" dirty="0">
                 <a:latin typeface="Courier"/>
                 <a:cs typeface="Courier"/>
               </a:rPr>
               <a:t>c</a:t>
             </a:r>
-            <a:endParaRPr lang="en-US" dirty="0">
-              <a:latin typeface="Courier"/>
-              <a:cs typeface="Courier"/>
-            </a:endParaRPr>
           </a:p>
         </p:txBody>
       </p:sp>
@@ -3900,8 +3944,8 @@
         </p:nvSpPr>
         <p:spPr>
           <a:xfrm>
-            <a:off x="1223491" y="5470544"/>
-            <a:ext cx="275661" cy="307777"/>
+            <a:off x="3782781" y="2774505"/>
+            <a:ext cx="248786" cy="230832"/>
           </a:xfrm>
           <a:prstGeom prst="rect">
             <a:avLst/>
@@ -3915,10 +3959,10 @@
           <a:lstStyle/>
           <a:p>
             <a:r>
-              <a:rPr lang="en-US" sz="1400" dirty="0" smtClean="0"/>
+              <a:rPr lang="en-US" sz="900" dirty="0" smtClean="0"/>
               <a:t>0</a:t>
             </a:r>
-            <a:endParaRPr lang="en-US" sz="1400" dirty="0"/>
+            <a:endParaRPr lang="en-US" sz="900" dirty="0"/>
           </a:p>
         </p:txBody>
       </p:sp>
@@ -3930,8 +3974,8 @@
         </p:nvSpPr>
         <p:spPr>
           <a:xfrm>
-            <a:off x="2418166" y="5473803"/>
-            <a:ext cx="275661" cy="307777"/>
+            <a:off x="4692453" y="2767990"/>
+            <a:ext cx="248786" cy="230832"/>
           </a:xfrm>
           <a:prstGeom prst="rect">
             <a:avLst/>
@@ -3945,10 +3989,10 @@
           <a:lstStyle/>
           <a:p>
             <a:r>
-              <a:rPr lang="en-US" sz="1400" dirty="0" smtClean="0"/>
+              <a:rPr lang="en-US" sz="900" dirty="0" smtClean="0"/>
               <a:t>0</a:t>
             </a:r>
-            <a:endParaRPr lang="en-US" sz="1400" dirty="0"/>
+            <a:endParaRPr lang="en-US" sz="900" dirty="0"/>
           </a:p>
         </p:txBody>
       </p:sp>
@@ -3960,8 +4004,8 @@
         </p:nvSpPr>
         <p:spPr>
           <a:xfrm>
-            <a:off x="1510892" y="4726421"/>
-            <a:ext cx="275661" cy="307777"/>
+            <a:off x="4042138" y="2195175"/>
+            <a:ext cx="243163" cy="230832"/>
           </a:xfrm>
           <a:prstGeom prst="rect">
             <a:avLst/>
@@ -3975,10 +4019,9 @@
           <a:lstStyle/>
           <a:p>
             <a:r>
-              <a:rPr lang="en-US" sz="1400" dirty="0"/>
+              <a:rPr lang="en-US" sz="900" dirty="0"/>
               <a:t>1</a:t>
             </a:r>
-            <a:endParaRPr lang="en-US" sz="1400" dirty="0"/>
           </a:p>
         </p:txBody>
       </p:sp>
@@ -3993,8 +4036,8 @@
         </p:nvCxnSpPr>
         <p:spPr>
           <a:xfrm flipH="1">
-            <a:off x="1648723" y="4913667"/>
-            <a:ext cx="323188" cy="321864"/>
+            <a:off x="4170389" y="2371048"/>
+            <a:ext cx="209484" cy="213143"/>
           </a:xfrm>
           <a:prstGeom prst="line">
             <a:avLst/>
@@ -4025,8 +4068,8 @@
         </p:nvCxnSpPr>
         <p:spPr>
           <a:xfrm>
-            <a:off x="1971911" y="4913667"/>
-            <a:ext cx="284661" cy="316609"/>
+            <a:off x="4379873" y="2389628"/>
+            <a:ext cx="177921" cy="185804"/>
           </a:xfrm>
           <a:prstGeom prst="line">
             <a:avLst/>
@@ -4055,8 +4098,8 @@
         </p:nvSpPr>
         <p:spPr>
           <a:xfrm>
-            <a:off x="6449848" y="4357100"/>
-            <a:ext cx="323188" cy="369332"/>
+            <a:off x="4081850" y="4038435"/>
+            <a:ext cx="269318" cy="261610"/>
           </a:xfrm>
           <a:prstGeom prst="rect">
             <a:avLst/>
@@ -4075,16 +4118,12 @@
           <a:lstStyle/>
           <a:p>
             <a:r>
-              <a:rPr lang="en-US" dirty="0">
+              <a:rPr lang="en-US" sz="1050" dirty="0">
                 <a:latin typeface="Courier"/>
                 <a:cs typeface="Courier"/>
               </a:rPr>
               <a:t>c</a:t>
             </a:r>
-            <a:endParaRPr lang="en-US" dirty="0">
-              <a:latin typeface="Courier"/>
-              <a:cs typeface="Courier"/>
-            </a:endParaRPr>
           </a:p>
         </p:txBody>
       </p:sp>
@@ -4096,8 +4135,8 @@
         </p:nvSpPr>
         <p:spPr>
           <a:xfrm>
-            <a:off x="7057697" y="4351845"/>
-            <a:ext cx="738754" cy="369332"/>
+            <a:off x="4601212" y="4038435"/>
+            <a:ext cx="523275" cy="261610"/>
           </a:xfrm>
           <a:prstGeom prst="rect">
             <a:avLst/>
@@ -4118,7 +4157,7 @@
           <a:lstStyle/>
           <a:p>
             <a:r>
-              <a:rPr lang="en-US" dirty="0">
+              <a:rPr lang="en-US" sz="1050" dirty="0">
                 <a:solidFill>
                   <a:schemeClr val="bg1">
                     <a:lumMod val="75000"/>
@@ -4130,7 +4169,7 @@
               <a:t>s</a:t>
             </a:r>
             <a:r>
-              <a:rPr lang="en-US" dirty="0" smtClean="0">
+              <a:rPr lang="en-US" sz="1050" dirty="0" smtClean="0">
                 <a:solidFill>
                   <a:schemeClr val="bg1">
                     <a:lumMod val="75000"/>
@@ -4142,7 +4181,7 @@
               <a:t>[</a:t>
             </a:r>
             <a:r>
-              <a:rPr lang="en-US" dirty="0" err="1" smtClean="0">
+              <a:rPr lang="en-US" sz="1050" dirty="0" err="1" smtClean="0">
                 <a:solidFill>
                   <a:schemeClr val="bg1">
                     <a:lumMod val="75000"/>
@@ -4154,7 +4193,7 @@
               <a:t>i</a:t>
             </a:r>
             <a:r>
-              <a:rPr lang="en-US" dirty="0" smtClean="0">
+              <a:rPr lang="en-US" sz="1050" dirty="0" smtClean="0">
                 <a:solidFill>
                   <a:schemeClr val="bg1">
                     <a:lumMod val="75000"/>
@@ -4165,7 +4204,7 @@
               </a:rPr>
               <a:t>]</a:t>
             </a:r>
-            <a:endParaRPr lang="en-US" dirty="0">
+            <a:endParaRPr lang="en-US" sz="1050" dirty="0">
               <a:solidFill>
                 <a:schemeClr val="bg1">
                   <a:lumMod val="75000"/>
@@ -4185,8 +4224,8 @@
         </p:nvSpPr>
         <p:spPr>
           <a:xfrm>
-            <a:off x="6773036" y="3665904"/>
-            <a:ext cx="323188" cy="369332"/>
+            <a:off x="4379873" y="3608849"/>
+            <a:ext cx="269318" cy="261610"/>
           </a:xfrm>
           <a:prstGeom prst="rect">
             <a:avLst/>
@@ -4205,16 +4244,12 @@
           <a:lstStyle/>
           <a:p>
             <a:r>
-              <a:rPr lang="en-US" dirty="0">
+              <a:rPr lang="en-US" sz="1050" dirty="0">
                 <a:latin typeface="Courier"/>
                 <a:cs typeface="Courier"/>
               </a:rPr>
               <a:t>c</a:t>
             </a:r>
-            <a:endParaRPr lang="en-US" dirty="0">
-              <a:latin typeface="Courier"/>
-              <a:cs typeface="Courier"/>
-            </a:endParaRPr>
           </a:p>
         </p:txBody>
       </p:sp>
@@ -4226,8 +4261,8 @@
         </p:nvSpPr>
         <p:spPr>
           <a:xfrm>
-            <a:off x="6198474" y="4593693"/>
-            <a:ext cx="278993" cy="307777"/>
+            <a:off x="3873144" y="4108189"/>
+            <a:ext cx="245305" cy="230832"/>
           </a:xfrm>
           <a:prstGeom prst="rect">
             <a:avLst/>
@@ -4241,10 +4276,10 @@
           <a:lstStyle/>
           <a:p>
             <a:r>
-              <a:rPr lang="en-US" sz="1400" dirty="0" smtClean="0"/>
-              <a:t>b</a:t>
-            </a:r>
-            <a:endParaRPr lang="en-US" sz="1400" dirty="0"/>
+              <a:rPr lang="en-US" sz="900" dirty="0"/>
+              <a:t>n</a:t>
+            </a:r>
+            <a:endParaRPr lang="en-US" sz="900" dirty="0"/>
           </a:p>
         </p:txBody>
       </p:sp>
@@ -4256,8 +4291,8 @@
         </p:nvSpPr>
         <p:spPr>
           <a:xfrm>
-            <a:off x="6410373" y="3855070"/>
-            <a:ext cx="459406" cy="307777"/>
+            <a:off x="4054097" y="3682599"/>
+            <a:ext cx="361284" cy="230832"/>
           </a:xfrm>
           <a:prstGeom prst="rect">
             <a:avLst/>
@@ -4271,14 +4306,18 @@
           <a:lstStyle/>
           <a:p>
             <a:r>
-              <a:rPr lang="en-US" sz="1400" dirty="0"/>
-              <a:t>b</a:t>
-            </a:r>
-            <a:r>
-              <a:rPr lang="en-US" sz="1400" dirty="0" smtClean="0"/>
-              <a:t>+1</a:t>
-            </a:r>
-            <a:endParaRPr lang="en-US" sz="1400" dirty="0"/>
+              <a:rPr lang="en-US" sz="900" dirty="0"/>
+              <a:t>n</a:t>
+            </a:r>
+            <a:r>
+              <a:rPr lang="en-US" sz="900" dirty="0" smtClean="0"/>
+              <a:t>+</a:t>
+            </a:r>
+            <a:r>
+              <a:rPr lang="en-US" sz="900" dirty="0" smtClean="0"/>
+              <a:t>1</a:t>
+            </a:r>
+            <a:endParaRPr lang="en-US" sz="900" dirty="0"/>
           </a:p>
         </p:txBody>
       </p:sp>
@@ -4293,8 +4332,8 @@
         </p:nvCxnSpPr>
         <p:spPr>
           <a:xfrm flipH="1">
-            <a:off x="6611442" y="4035236"/>
-            <a:ext cx="323188" cy="321864"/>
+            <a:off x="4216509" y="3870459"/>
+            <a:ext cx="298023" cy="167976"/>
           </a:xfrm>
           <a:prstGeom prst="line">
             <a:avLst/>
@@ -4319,14 +4358,15 @@
         <p:nvCxnSpPr>
           <p:cNvPr id="27" name="Straight Connector 26"/>
           <p:cNvCxnSpPr>
+            <a:stCxn id="22" idx="2"/>
             <a:endCxn id="21" idx="0"/>
           </p:cNvCxnSpPr>
           <p:nvPr/>
         </p:nvCxnSpPr>
         <p:spPr>
           <a:xfrm>
-            <a:off x="6934630" y="4035236"/>
-            <a:ext cx="492444" cy="316609"/>
+            <a:off x="4514532" y="3870459"/>
+            <a:ext cx="348318" cy="167976"/>
           </a:xfrm>
           <a:prstGeom prst="line">
             <a:avLst/>
@@ -4355,8 +4395,8 @@
         </p:nvSpPr>
         <p:spPr>
           <a:xfrm>
-            <a:off x="6124889" y="5061948"/>
-            <a:ext cx="323188" cy="369332"/>
+            <a:off x="3743547" y="4466804"/>
+            <a:ext cx="269318" cy="261610"/>
           </a:xfrm>
           <a:prstGeom prst="rect">
             <a:avLst/>
@@ -4375,16 +4415,12 @@
           <a:lstStyle/>
           <a:p>
             <a:r>
-              <a:rPr lang="en-US" dirty="0">
+              <a:rPr lang="en-US" sz="1050" dirty="0">
                 <a:latin typeface="Courier"/>
                 <a:cs typeface="Courier"/>
               </a:rPr>
               <a:t>c</a:t>
             </a:r>
-            <a:endParaRPr lang="en-US" dirty="0">
-              <a:latin typeface="Courier"/>
-              <a:cs typeface="Courier"/>
-            </a:endParaRPr>
           </a:p>
         </p:txBody>
       </p:sp>
@@ -4396,8 +4432,8 @@
         </p:nvSpPr>
         <p:spPr>
           <a:xfrm>
-            <a:off x="6732738" y="5056693"/>
-            <a:ext cx="738754" cy="369332"/>
+            <a:off x="4316132" y="4487290"/>
+            <a:ext cx="523275" cy="261610"/>
           </a:xfrm>
           <a:prstGeom prst="rect">
             <a:avLst/>
@@ -4418,7 +4454,7 @@
           <a:lstStyle/>
           <a:p>
             <a:r>
-              <a:rPr lang="en-US" dirty="0">
+              <a:rPr lang="en-US" sz="1050" dirty="0">
                 <a:solidFill>
                   <a:schemeClr val="bg1">
                     <a:lumMod val="75000"/>
@@ -4430,7 +4466,7 @@
               <a:t>s</a:t>
             </a:r>
             <a:r>
-              <a:rPr lang="en-US" dirty="0" smtClean="0">
+              <a:rPr lang="en-US" sz="1050" dirty="0" smtClean="0">
                 <a:solidFill>
                   <a:schemeClr val="bg1">
                     <a:lumMod val="75000"/>
@@ -4442,7 +4478,7 @@
               <a:t>[</a:t>
             </a:r>
             <a:r>
-              <a:rPr lang="en-US" dirty="0" err="1" smtClean="0">
+              <a:rPr lang="en-US" sz="1050" dirty="0" err="1" smtClean="0">
                 <a:solidFill>
                   <a:schemeClr val="bg1">
                     <a:lumMod val="75000"/>
@@ -4454,7 +4490,7 @@
               <a:t>i</a:t>
             </a:r>
             <a:r>
-              <a:rPr lang="en-US" dirty="0" smtClean="0">
+              <a:rPr lang="en-US" sz="1050" dirty="0" smtClean="0">
                 <a:solidFill>
                   <a:schemeClr val="bg1">
                     <a:lumMod val="75000"/>
@@ -4465,7 +4501,7 @@
               </a:rPr>
               <a:t>]</a:t>
             </a:r>
-            <a:endParaRPr lang="en-US" dirty="0">
+            <a:endParaRPr lang="en-US" sz="1050" dirty="0">
               <a:solidFill>
                 <a:schemeClr val="bg1">
                   <a:lumMod val="75000"/>
@@ -4485,8 +4521,8 @@
         </p:nvSpPr>
         <p:spPr>
           <a:xfrm>
-            <a:off x="5741522" y="5333577"/>
-            <a:ext cx="424954" cy="307777"/>
+            <a:off x="3472155" y="4582065"/>
+            <a:ext cx="339137" cy="230832"/>
           </a:xfrm>
           <a:prstGeom prst="rect">
             <a:avLst/>
@@ -4500,29 +4536,202 @@
           <a:lstStyle/>
           <a:p>
             <a:r>
-              <a:rPr lang="en-US" sz="1400" dirty="0"/>
-              <a:t>b</a:t>
-            </a:r>
-            <a:r>
-              <a:rPr lang="en-US" sz="1400" dirty="0" smtClean="0"/>
-              <a:t>-1</a:t>
-            </a:r>
-            <a:endParaRPr lang="en-US" sz="1400" dirty="0"/>
+              <a:rPr lang="en-US" sz="900" dirty="0"/>
+              <a:t>n</a:t>
+            </a:r>
+            <a:r>
+              <a:rPr lang="en-US" sz="900" dirty="0" smtClean="0"/>
+              <a:t>-</a:t>
+            </a:r>
+            <a:r>
+              <a:rPr lang="en-US" sz="900" dirty="0" smtClean="0"/>
+              <a:t>1</a:t>
+            </a:r>
+            <a:endParaRPr lang="en-US" sz="900" dirty="0"/>
+          </a:p>
+        </p:txBody>
+      </p:sp>
+      <p:sp>
+        <p:nvSpPr>
+          <p:cNvPr id="33" name="TextBox 32"/>
+          <p:cNvSpPr txBox="1"/>
+          <p:nvPr/>
+        </p:nvSpPr>
+        <p:spPr>
+          <a:xfrm>
+            <a:off x="3413987" y="4826088"/>
+            <a:ext cx="282061" cy="261610"/>
+          </a:xfrm>
+          <a:prstGeom prst="rect">
+            <a:avLst/>
+          </a:prstGeom>
+          <a:noFill/>
+        </p:spPr>
+        <p:txBody>
+          <a:bodyPr wrap="none" rtlCol="0">
+            <a:spAutoFit/>
+          </a:bodyPr>
+          <a:lstStyle/>
+          <a:p>
+            <a:r>
+              <a:rPr lang="en-US" sz="1050" dirty="0" smtClean="0"/>
+              <a:t>…</a:t>
+            </a:r>
+            <a:endParaRPr lang="en-US" sz="1050" dirty="0"/>
+          </a:p>
+        </p:txBody>
+      </p:sp>
+      <p:sp>
+        <p:nvSpPr>
+          <p:cNvPr id="36" name="TextBox 35"/>
+          <p:cNvSpPr txBox="1"/>
+          <p:nvPr/>
+        </p:nvSpPr>
+        <p:spPr>
+          <a:xfrm>
+            <a:off x="3317139" y="3025232"/>
+            <a:ext cx="2335683" cy="253916"/>
+          </a:xfrm>
+          <a:prstGeom prst="rect">
+            <a:avLst/>
+          </a:prstGeom>
+          <a:noFill/>
+        </p:spPr>
+        <p:txBody>
+          <a:bodyPr wrap="none" rtlCol="0">
+            <a:spAutoFit/>
+          </a:bodyPr>
+          <a:lstStyle/>
+          <a:p>
+            <a:r>
+              <a:rPr lang="en-US" sz="1050" dirty="0" smtClean="0"/>
+              <a:t>Line 2: </a:t>
+            </a:r>
+            <a:r>
+              <a:rPr lang="en-US" sz="1050" dirty="0" err="1" smtClean="0"/>
+              <a:t>tcn</a:t>
+            </a:r>
+            <a:r>
+              <a:rPr lang="en-US" sz="1050" dirty="0" smtClean="0"/>
+              <a:t>(c) = 1+max(</a:t>
+            </a:r>
+            <a:r>
+              <a:rPr lang="en-US" sz="1050" dirty="0" err="1" smtClean="0"/>
+              <a:t>tcn</a:t>
+            </a:r>
+            <a:r>
+              <a:rPr lang="en-US" sz="1050" dirty="0" smtClean="0"/>
+              <a:t>(a),</a:t>
+            </a:r>
+            <a:r>
+              <a:rPr lang="en-US" sz="1050" dirty="0" err="1" smtClean="0"/>
+              <a:t>tcn</a:t>
+            </a:r>
+            <a:r>
+              <a:rPr lang="en-US" sz="1050" dirty="0" smtClean="0"/>
+              <a:t>(b)) = 1</a:t>
+            </a:r>
+            <a:endParaRPr lang="en-US" sz="1050" dirty="0"/>
+          </a:p>
+        </p:txBody>
+      </p:sp>
+      <p:sp>
+        <p:nvSpPr>
+          <p:cNvPr id="37" name="TextBox 36"/>
+          <p:cNvSpPr txBox="1"/>
+          <p:nvPr/>
+        </p:nvSpPr>
+        <p:spPr>
+          <a:xfrm>
+            <a:off x="3136647" y="5091775"/>
+            <a:ext cx="2521487" cy="577081"/>
+          </a:xfrm>
+          <a:prstGeom prst="rect">
+            <a:avLst/>
+          </a:prstGeom>
+          <a:noFill/>
+        </p:spPr>
+        <p:txBody>
+          <a:bodyPr wrap="none" rtlCol="0">
+            <a:spAutoFit/>
+          </a:bodyPr>
+          <a:lstStyle/>
+          <a:p>
+            <a:r>
+              <a:rPr lang="en-US" sz="1050" dirty="0" smtClean="0"/>
+              <a:t>Line 4: </a:t>
+            </a:r>
+            <a:r>
+              <a:rPr lang="en-US" sz="1050" dirty="0" err="1" smtClean="0"/>
+              <a:t>tcn</a:t>
+            </a:r>
+            <a:r>
+              <a:rPr lang="en-US" sz="1050" dirty="0" smtClean="0"/>
+              <a:t>(c) = 1+max(</a:t>
+            </a:r>
+            <a:r>
+              <a:rPr lang="en-US" sz="1050" dirty="0" err="1" smtClean="0"/>
+              <a:t>tcn</a:t>
+            </a:r>
+            <a:r>
+              <a:rPr lang="en-US" sz="1050" dirty="0" smtClean="0"/>
+              <a:t>(c),</a:t>
+            </a:r>
+            <a:r>
+              <a:rPr lang="en-US" sz="1050" dirty="0" err="1" smtClean="0"/>
+              <a:t>tcn</a:t>
+            </a:r>
+            <a:r>
+              <a:rPr lang="en-US" sz="1050" dirty="0" smtClean="0"/>
+              <a:t>(s[</a:t>
+            </a:r>
+            <a:r>
+              <a:rPr lang="en-US" sz="1050" dirty="0" err="1" smtClean="0"/>
+              <a:t>i</a:t>
+            </a:r>
+            <a:r>
+              <a:rPr lang="en-US" sz="1050" dirty="0" smtClean="0"/>
+              <a:t>])) = i+2</a:t>
+            </a:r>
+          </a:p>
+          <a:p>
+            <a:r>
+              <a:rPr lang="en-US" sz="1050" dirty="0" smtClean="0"/>
+              <a:t>Line </a:t>
+            </a:r>
+            <a:r>
+              <a:rPr lang="en-US" sz="1050" dirty="0" smtClean="0"/>
+              <a:t>6: </a:t>
+            </a:r>
+            <a:r>
+              <a:rPr lang="en-US" sz="1050" dirty="0" err="1" smtClean="0"/>
+              <a:t>tcn</a:t>
+            </a:r>
+            <a:r>
+              <a:rPr lang="en-US" sz="1050" dirty="0" smtClean="0"/>
+              <a:t>(c) = </a:t>
+            </a:r>
+            <a:r>
+              <a:rPr lang="en-US" sz="1050" dirty="0" smtClean="0"/>
+              <a:t>n+1</a:t>
+            </a:r>
+            <a:endParaRPr lang="en-US" sz="1050" dirty="0" smtClean="0"/>
+          </a:p>
+          <a:p>
+            <a:endParaRPr lang="en-US" sz="1050" dirty="0"/>
           </a:p>
         </p:txBody>
       </p:sp>
       <p:cxnSp>
         <p:nvCxnSpPr>
-          <p:cNvPr id="31" name="Straight Connector 30"/>
-          <p:cNvCxnSpPr>
-            <a:endCxn id="28" idx="0"/>
-          </p:cNvCxnSpPr>
+          <p:cNvPr id="39" name="Straight Connector 38"/>
+          <p:cNvCxnSpPr/>
           <p:nvPr/>
         </p:nvCxnSpPr>
         <p:spPr>
           <a:xfrm flipH="1">
-            <a:off x="6286483" y="4740084"/>
-            <a:ext cx="323188" cy="321864"/>
+            <a:off x="3911605" y="4298828"/>
+            <a:ext cx="298023" cy="167976"/>
           </a:xfrm>
           <a:prstGeom prst="line">
             <a:avLst/>
@@ -4545,87 +4754,18 @@
       </p:cxnSp>
       <p:cxnSp>
         <p:nvCxnSpPr>
-          <p:cNvPr id="32" name="Straight Connector 31"/>
-          <p:cNvCxnSpPr>
-            <a:endCxn id="29" idx="0"/>
-          </p:cNvCxnSpPr>
+          <p:cNvPr id="40" name="Straight Connector 39"/>
+          <p:cNvCxnSpPr/>
           <p:nvPr/>
         </p:nvCxnSpPr>
         <p:spPr>
           <a:xfrm>
-            <a:off x="6609671" y="4740084"/>
-            <a:ext cx="492444" cy="316609"/>
+            <a:off x="4209628" y="4298828"/>
+            <a:ext cx="348318" cy="167976"/>
           </a:xfrm>
           <a:prstGeom prst="line">
             <a:avLst/>
           </a:prstGeom>
-        </p:spPr>
-        <p:style>
-          <a:lnRef idx="2">
-            <a:schemeClr val="accent1"/>
-          </a:lnRef>
-          <a:fillRef idx="0">
-            <a:schemeClr val="accent1"/>
-          </a:fillRef>
-          <a:effectRef idx="1">
-            <a:schemeClr val="accent1"/>
-          </a:effectRef>
-          <a:fontRef idx="minor">
-            <a:schemeClr val="tx1"/>
-          </a:fontRef>
-        </p:style>
-      </p:cxnSp>
-      <p:sp>
-        <p:nvSpPr>
-          <p:cNvPr id="33" name="TextBox 32"/>
-          <p:cNvSpPr txBox="1"/>
-          <p:nvPr/>
-        </p:nvSpPr>
-        <p:spPr>
-          <a:xfrm>
-            <a:off x="5776161" y="5675248"/>
-            <a:ext cx="344039" cy="369332"/>
-          </a:xfrm>
-          <a:prstGeom prst="rect">
-            <a:avLst/>
-          </a:prstGeom>
-          <a:noFill/>
-        </p:spPr>
-        <p:txBody>
-          <a:bodyPr wrap="none" rtlCol="0">
-            <a:spAutoFit/>
-          </a:bodyPr>
-          <a:lstStyle/>
-          <a:p>
-            <a:r>
-              <a:rPr lang="en-US" dirty="0" smtClean="0"/>
-              <a:t>…</a:t>
-            </a:r>
-            <a:endParaRPr lang="en-US" dirty="0"/>
-          </a:p>
-        </p:txBody>
-      </p:sp>
-      <p:cxnSp>
-        <p:nvCxnSpPr>
-          <p:cNvPr id="34" name="Straight Connector 33"/>
-          <p:cNvCxnSpPr/>
-          <p:nvPr/>
-        </p:nvCxnSpPr>
-        <p:spPr>
-          <a:xfrm flipH="1">
-            <a:off x="5948181" y="5440620"/>
-            <a:ext cx="323188" cy="321864"/>
-          </a:xfrm>
-          <a:prstGeom prst="line">
-            <a:avLst/>
-          </a:prstGeom>
-          <a:ln>
-            <a:solidFill>
-              <a:schemeClr val="bg1">
-                <a:lumMod val="85000"/>
-              </a:schemeClr>
-            </a:solidFill>
-          </a:ln>
         </p:spPr>
         <p:style>
           <a:lnRef idx="2">
@@ -4644,14 +4784,14 @@
       </p:cxnSp>
       <p:cxnSp>
         <p:nvCxnSpPr>
-          <p:cNvPr id="35" name="Straight Connector 34"/>
+          <p:cNvPr id="41" name="Straight Connector 40"/>
           <p:cNvCxnSpPr/>
           <p:nvPr/>
         </p:nvCxnSpPr>
         <p:spPr>
-          <a:xfrm>
-            <a:off x="6271369" y="5440620"/>
-            <a:ext cx="492444" cy="316609"/>
+          <a:xfrm flipH="1">
+            <a:off x="3588435" y="4728414"/>
+            <a:ext cx="298023" cy="167976"/>
           </a:xfrm>
           <a:prstGeom prst="line">
             <a:avLst/>
@@ -4659,7 +4799,7 @@
           <a:ln>
             <a:solidFill>
               <a:schemeClr val="bg1">
-                <a:lumMod val="85000"/>
+                <a:lumMod val="75000"/>
               </a:schemeClr>
             </a:solidFill>
           </a:ln>
@@ -4679,16 +4819,53 @@
           </a:fontRef>
         </p:style>
       </p:cxnSp>
-      <p:sp>
-        <p:nvSpPr>
-          <p:cNvPr id="36" name="TextBox 35"/>
+      <p:cxnSp>
+        <p:nvCxnSpPr>
+          <p:cNvPr id="42" name="Straight Connector 41"/>
+          <p:cNvCxnSpPr/>
+          <p:nvPr/>
+        </p:nvCxnSpPr>
+        <p:spPr>
+          <a:xfrm>
+            <a:off x="3886458" y="4728414"/>
+            <a:ext cx="348318" cy="167976"/>
+          </a:xfrm>
+          <a:prstGeom prst="line">
+            <a:avLst/>
+          </a:prstGeom>
+          <a:ln>
+            <a:solidFill>
+              <a:schemeClr val="bg1">
+                <a:lumMod val="75000"/>
+              </a:schemeClr>
+            </a:solidFill>
+          </a:ln>
+        </p:spPr>
+        <p:style>
+          <a:lnRef idx="2">
+            <a:schemeClr val="accent1"/>
+          </a:lnRef>
+          <a:fillRef idx="0">
+            <a:schemeClr val="accent1"/>
+          </a:fillRef>
+          <a:effectRef idx="1">
+            <a:schemeClr val="accent1"/>
+          </a:effectRef>
+          <a:fontRef idx="minor">
+            <a:schemeClr val="tx1"/>
+          </a:fontRef>
+        </p:style>
+      </p:cxnSp>
+      <p:sp>
+        <p:nvSpPr>
+          <p:cNvPr id="43" name="TextBox 42"/>
           <p:cNvSpPr txBox="1"/>
           <p:nvPr/>
         </p:nvSpPr>
         <p:spPr>
           <a:xfrm>
-            <a:off x="320510" y="6213977"/>
-            <a:ext cx="3872124" cy="369332"/>
+            <a:off x="4146820" y="4821406"/>
+            <a:ext cx="282061" cy="261610"/>
           </a:xfrm>
           <a:prstGeom prst="rect">
             <a:avLst/>
@@ -4702,142 +4879,10 @@
           <a:lstStyle/>
           <a:p>
             <a:r>
-              <a:rPr lang="en-US" dirty="0" smtClean="0"/>
-              <a:t>Line 2: </a:t>
-            </a:r>
-            <a:r>
-              <a:rPr lang="en-US" dirty="0" err="1" smtClean="0"/>
-              <a:t>tcn</a:t>
-            </a:r>
-            <a:r>
-              <a:rPr lang="en-US" dirty="0" smtClean="0"/>
-              <a:t>(c) = 1+max(</a:t>
-            </a:r>
-            <a:r>
-              <a:rPr lang="en-US" dirty="0" err="1" smtClean="0"/>
-              <a:t>tcn</a:t>
-            </a:r>
-            <a:r>
-              <a:rPr lang="en-US" dirty="0" smtClean="0"/>
-              <a:t>(a),</a:t>
-            </a:r>
-            <a:r>
-              <a:rPr lang="en-US" dirty="0" err="1" smtClean="0"/>
-              <a:t>tcn</a:t>
-            </a:r>
-            <a:r>
-              <a:rPr lang="en-US" dirty="0" smtClean="0"/>
-              <a:t>(b)) = 1</a:t>
-            </a:r>
-            <a:endParaRPr lang="en-US" dirty="0"/>
-          </a:p>
-        </p:txBody>
-      </p:sp>
-      <p:sp>
-        <p:nvSpPr>
-          <p:cNvPr id="37" name="TextBox 36"/>
-          <p:cNvSpPr txBox="1"/>
-          <p:nvPr/>
-        </p:nvSpPr>
-        <p:spPr>
-          <a:xfrm>
-            <a:off x="4839307" y="6044580"/>
-            <a:ext cx="4190645" cy="923330"/>
-          </a:xfrm>
-          <a:prstGeom prst="rect">
-            <a:avLst/>
-          </a:prstGeom>
-          <a:noFill/>
-        </p:spPr>
-        <p:txBody>
-          <a:bodyPr wrap="none" rtlCol="0">
-            <a:spAutoFit/>
-          </a:bodyPr>
-          <a:lstStyle/>
-          <a:p>
-            <a:r>
-              <a:rPr lang="en-US" dirty="0" smtClean="0"/>
-              <a:t>Line 4: </a:t>
-            </a:r>
-            <a:r>
-              <a:rPr lang="en-US" dirty="0" err="1" smtClean="0"/>
-              <a:t>tcn</a:t>
-            </a:r>
-            <a:r>
-              <a:rPr lang="en-US" dirty="0" smtClean="0"/>
-              <a:t>(c) = 1+max(</a:t>
-            </a:r>
-            <a:r>
-              <a:rPr lang="en-US" dirty="0" err="1" smtClean="0"/>
-              <a:t>tcn</a:t>
-            </a:r>
-            <a:r>
-              <a:rPr lang="en-US" dirty="0" smtClean="0"/>
-              <a:t>(c),</a:t>
-            </a:r>
-            <a:r>
-              <a:rPr lang="en-US" dirty="0" err="1" smtClean="0"/>
-              <a:t>tcn</a:t>
-            </a:r>
-            <a:r>
-              <a:rPr lang="en-US" dirty="0" smtClean="0"/>
-              <a:t>(s[</a:t>
-            </a:r>
-            <a:r>
-              <a:rPr lang="en-US" dirty="0" err="1" smtClean="0"/>
-              <a:t>i</a:t>
-            </a:r>
-            <a:r>
-              <a:rPr lang="en-US" dirty="0" smtClean="0"/>
-              <a:t>])) = i+2</a:t>
-            </a:r>
-          </a:p>
-          <a:p>
-            <a:r>
-              <a:rPr lang="en-US" dirty="0" smtClean="0"/>
-              <a:t>Line 5: </a:t>
-            </a:r>
-            <a:r>
-              <a:rPr lang="en-US" dirty="0" err="1" smtClean="0"/>
-              <a:t>tcn</a:t>
-            </a:r>
-            <a:r>
-              <a:rPr lang="en-US" dirty="0" smtClean="0"/>
-              <a:t>(c) = b+1</a:t>
-            </a:r>
-          </a:p>
-          <a:p>
-            <a:endParaRPr lang="en-US" dirty="0"/>
-          </a:p>
-        </p:txBody>
-      </p:sp>
-      <p:sp>
-        <p:nvSpPr>
-          <p:cNvPr id="38" name="TextBox 37"/>
-          <p:cNvSpPr txBox="1"/>
-          <p:nvPr/>
-        </p:nvSpPr>
-        <p:spPr>
-          <a:xfrm>
-            <a:off x="6697759" y="5672409"/>
-            <a:ext cx="344039" cy="369332"/>
-          </a:xfrm>
-          <a:prstGeom prst="rect">
-            <a:avLst/>
-          </a:prstGeom>
-          <a:noFill/>
-        </p:spPr>
-        <p:txBody>
-          <a:bodyPr wrap="none" rtlCol="0">
-            <a:spAutoFit/>
-          </a:bodyPr>
-          <a:lstStyle/>
-          <a:p>
-            <a:r>
-              <a:rPr lang="en-US" dirty="0" smtClean="0"/>
+              <a:rPr lang="en-US" sz="1050" dirty="0" smtClean="0"/>
               <a:t>…</a:t>
             </a:r>
-            <a:endParaRPr lang="en-US" dirty="0"/>
+            <a:endParaRPr lang="en-US" sz="1050" dirty="0"/>
           </a:p>
         </p:txBody>
       </p:sp>

</xml_diff>